<commit_message>
update files for week 01
</commit_message>
<xml_diff>
--- a/docs/Lectures/Week01/Week01_Intro.pptx
+++ b/docs/Lectures/Week01/Week01_Intro.pptx
@@ -24,9 +24,10 @@
     <p:sldId id="274" r:id="rId18"/>
     <p:sldId id="275" r:id="rId19"/>
     <p:sldId id="276" r:id="rId20"/>
-    <p:sldId id="277" r:id="rId21"/>
-    <p:sldId id="270" r:id="rId22"/>
-    <p:sldId id="271" r:id="rId23"/>
+    <p:sldId id="278" r:id="rId21"/>
+    <p:sldId id="277" r:id="rId22"/>
+    <p:sldId id="270" r:id="rId23"/>
+    <p:sldId id="271" r:id="rId24"/>
   </p:sldIdLst>
   <p:sldSz cx="12192000" cy="6858000"/>
   <p:notesSz cx="6858000" cy="9144000"/>
@@ -1076,38 +1077,37 @@
           <a:p>
             <a:pPr lvl="0"/>
             <a:r>
-              <a:rPr lang="en-US"/>
+              <a:rPr lang="en-US" dirty="0"/>
               <a:t>Click to edit Master text styles</a:t>
             </a:r>
           </a:p>
           <a:p>
             <a:pPr lvl="1"/>
             <a:r>
-              <a:rPr lang="en-US"/>
+              <a:rPr lang="en-US" dirty="0"/>
               <a:t>Second level</a:t>
             </a:r>
           </a:p>
           <a:p>
             <a:pPr lvl="2"/>
             <a:r>
-              <a:rPr lang="en-US"/>
+              <a:rPr lang="en-US" dirty="0"/>
               <a:t>Third level</a:t>
             </a:r>
           </a:p>
           <a:p>
             <a:pPr lvl="3"/>
             <a:r>
-              <a:rPr lang="en-US"/>
+              <a:rPr lang="en-US" dirty="0"/>
               <a:t>Fourth level</a:t>
             </a:r>
           </a:p>
           <a:p>
             <a:pPr lvl="4"/>
             <a:r>
-              <a:rPr lang="en-US"/>
+              <a:rPr lang="en-US" dirty="0"/>
               <a:t>Fifth level</a:t>
             </a:r>
-            <a:endParaRPr lang="en-US" dirty="0"/>
           </a:p>
         </p:txBody>
       </p:sp>
@@ -1297,10 +1297,9 @@
           </a:lstStyle>
           <a:p>
             <a:r>
-              <a:rPr lang="en-US"/>
+              <a:rPr lang="en-US" dirty="0"/>
               <a:t>Click to edit Master title style</a:t>
             </a:r>
-            <a:endParaRPr lang="en-US" dirty="0"/>
           </a:p>
         </p:txBody>
       </p:sp>
@@ -4263,7 +4262,7 @@
         </p:nvSpPr>
         <p:spPr>
           <a:xfrm>
-            <a:off x="581360" y="1453800"/>
+            <a:off x="581360" y="1212302"/>
             <a:ext cx="11029615" cy="999102"/>
           </a:xfrm>
         </p:spPr>
@@ -4478,7 +4477,7 @@
         </p:nvSpPr>
         <p:spPr>
           <a:xfrm>
-            <a:off x="580857" y="1399032"/>
+            <a:off x="581360" y="1298448"/>
             <a:ext cx="11029615" cy="896112"/>
           </a:xfrm>
         </p:spPr>
@@ -5652,7 +5651,7 @@
         </p:nvSpPr>
         <p:spPr>
           <a:xfrm>
-            <a:off x="581192" y="2340864"/>
+            <a:off x="581360" y="1532382"/>
             <a:ext cx="11029615" cy="2520061"/>
           </a:xfrm>
         </p:spPr>
@@ -5754,7 +5753,7 @@
         </p:blipFill>
         <p:spPr>
           <a:xfrm>
-            <a:off x="6370637" y="4302125"/>
+            <a:off x="6096000" y="3515741"/>
             <a:ext cx="314325" cy="285750"/>
           </a:xfrm>
           <a:prstGeom prst="rect">
@@ -6124,7 +6123,7 @@
         <p:spPr>
           <a:xfrm>
             <a:off x="581192" y="1604211"/>
-            <a:ext cx="11029615" cy="4371139"/>
+            <a:ext cx="11029615" cy="1577901"/>
           </a:xfrm>
         </p:spPr>
         <p:txBody>
@@ -6209,6 +6208,146 @@
           <p:cNvPr id="2" name="Title 1">
             <a:extLst>
               <a:ext uri="{FF2B5EF4-FFF2-40B4-BE49-F238E27FC236}">
+                <a16:creationId xmlns:a16="http://schemas.microsoft.com/office/drawing/2014/main" id="{8862BBB0-0FBE-B2B8-506E-78322C7EB688}"/>
+              </a:ext>
+            </a:extLst>
+          </p:cNvPr>
+          <p:cNvSpPr>
+            <a:spLocks noGrp="1"/>
+          </p:cNvSpPr>
+          <p:nvPr>
+            <p:ph type="title"/>
+          </p:nvPr>
+        </p:nvSpPr>
+        <p:spPr>
+          <a:xfrm>
+            <a:off x="581192" y="702156"/>
+            <a:ext cx="11029616" cy="523140"/>
+          </a:xfrm>
+        </p:spPr>
+        <p:txBody>
+          <a:bodyPr/>
+          <a:lstStyle/>
+          <a:p>
+            <a:r>
+              <a:rPr lang="en-US" dirty="0"/>
+              <a:t>LIST IN R</a:t>
+            </a:r>
+          </a:p>
+        </p:txBody>
+      </p:sp>
+      <p:sp>
+        <p:nvSpPr>
+          <p:cNvPr id="3" name="Content Placeholder 2">
+            <a:extLst>
+              <a:ext uri="{FF2B5EF4-FFF2-40B4-BE49-F238E27FC236}">
+                <a16:creationId xmlns:a16="http://schemas.microsoft.com/office/drawing/2014/main" id="{BAAB52E6-6887-C0A3-DDE3-CA6AAA229011}"/>
+              </a:ext>
+            </a:extLst>
+          </p:cNvPr>
+          <p:cNvSpPr>
+            <a:spLocks noGrp="1"/>
+          </p:cNvSpPr>
+          <p:nvPr>
+            <p:ph idx="1"/>
+          </p:nvPr>
+        </p:nvSpPr>
+        <p:spPr>
+          <a:xfrm>
+            <a:off x="581193" y="1437540"/>
+            <a:ext cx="11029615" cy="2988156"/>
+          </a:xfrm>
+        </p:spPr>
+        <p:txBody>
+          <a:bodyPr>
+            <a:normAutofit/>
+          </a:bodyPr>
+          <a:lstStyle/>
+          <a:p>
+            <a:r>
+              <a:rPr lang="en-US" dirty="0"/>
+              <a:t>Creating a list</a:t>
+            </a:r>
+          </a:p>
+          <a:p>
+            <a:pPr lvl="1"/>
+            <a:r>
+              <a:rPr lang="en-US" dirty="0"/>
+              <a:t>A list in R is a flexible data structure that can contain elements of different types: numbers, characters, vectors, matrices, data frames, or even other lists.</a:t>
+            </a:r>
+          </a:p>
+          <a:p>
+            <a:pPr lvl="1"/>
+            <a:r>
+              <a:rPr lang="en-US" dirty="0"/>
+              <a:t>It's like a container for multiple objects.</a:t>
+            </a:r>
+          </a:p>
+          <a:p>
+            <a:pPr lvl="1"/>
+            <a:endParaRPr lang="en-US" dirty="0"/>
+          </a:p>
+          <a:p>
+            <a:r>
+              <a:rPr lang="en-US" dirty="0"/>
+              <a:t>Accessing elements in a list</a:t>
+            </a:r>
+          </a:p>
+          <a:p>
+            <a:pPr lvl="1"/>
+            <a:r>
+              <a:rPr lang="en-US" dirty="0"/>
+              <a:t>Use [[ ]] to access elements by position or name.</a:t>
+            </a:r>
+          </a:p>
+          <a:p>
+            <a:pPr lvl="1"/>
+            <a:r>
+              <a:rPr lang="en-US" dirty="0"/>
+              <a:t>Use $ to access elements by name.</a:t>
+            </a:r>
+          </a:p>
+          <a:p>
+            <a:pPr lvl="1"/>
+            <a:endParaRPr lang="en-US" dirty="0"/>
+          </a:p>
+        </p:txBody>
+      </p:sp>
+    </p:spTree>
+    <p:extLst>
+      <p:ext uri="{BB962C8B-B14F-4D97-AF65-F5344CB8AC3E}">
+        <p14:creationId xmlns:p14="http://schemas.microsoft.com/office/powerpoint/2010/main" val="226845293"/>
+      </p:ext>
+    </p:extLst>
+  </p:cSld>
+  <p:clrMapOvr>
+    <a:masterClrMapping/>
+  </p:clrMapOvr>
+</p:sld>
+</file>
+
+<file path=ppt/slides/slide21.xml><?xml version="1.0" encoding="utf-8"?>
+<p:sld xmlns:a="http://schemas.openxmlformats.org/drawingml/2006/main" xmlns:r="http://schemas.openxmlformats.org/officeDocument/2006/relationships" xmlns:p="http://schemas.openxmlformats.org/presentationml/2006/main">
+  <p:cSld>
+    <p:spTree>
+      <p:nvGrpSpPr>
+        <p:cNvPr id="1" name=""/>
+        <p:cNvGrpSpPr/>
+        <p:nvPr/>
+      </p:nvGrpSpPr>
+      <p:grpSpPr>
+        <a:xfrm>
+          <a:off x="0" y="0"/>
+          <a:ext cx="0" cy="0"/>
+          <a:chOff x="0" y="0"/>
+          <a:chExt cx="0" cy="0"/>
+        </a:xfrm>
+      </p:grpSpPr>
+      <p:sp>
+        <p:nvSpPr>
+          <p:cNvPr id="2" name="Title 1">
+            <a:extLst>
+              <a:ext uri="{FF2B5EF4-FFF2-40B4-BE49-F238E27FC236}">
                 <a16:creationId xmlns:a16="http://schemas.microsoft.com/office/drawing/2014/main" id="{5EAF1A1A-5D62-6502-24F8-E47A009B8D56}"/>
               </a:ext>
             </a:extLst>
@@ -6220,7 +6359,12 @@
             <p:ph type="title"/>
           </p:nvPr>
         </p:nvSpPr>
-        <p:spPr/>
+        <p:spPr>
+          <a:xfrm>
+            <a:off x="581192" y="702156"/>
+            <a:ext cx="11029616" cy="550572"/>
+          </a:xfrm>
+        </p:spPr>
         <p:txBody>
           <a:bodyPr/>
           <a:lstStyle/>
@@ -6248,12 +6392,67 @@
             <p:ph idx="1"/>
           </p:nvPr>
         </p:nvSpPr>
-        <p:spPr/>
-        <p:txBody>
-          <a:bodyPr/>
+        <p:spPr>
+          <a:xfrm>
+            <a:off x="581191" y="1442820"/>
+            <a:ext cx="11029615" cy="2498244"/>
+          </a:xfrm>
+        </p:spPr>
+        <p:txBody>
+          <a:bodyPr>
+            <a:normAutofit/>
+          </a:bodyPr>
           <a:lstStyle/>
           <a:p>
-            <a:endParaRPr lang="en-US"/>
+            <a:r>
+              <a:rPr lang="en-US" dirty="0"/>
+              <a:t>Read csv</a:t>
+            </a:r>
+          </a:p>
+          <a:p>
+            <a:pPr lvl="1"/>
+            <a:r>
+              <a:rPr lang="en-US" b="1" dirty="0"/>
+              <a:t>read.csv() </a:t>
+            </a:r>
+            <a:r>
+              <a:rPr lang="en-US" dirty="0"/>
+              <a:t>for reading CSV files.</a:t>
+            </a:r>
+          </a:p>
+          <a:p>
+            <a:r>
+              <a:rPr lang="en-US" dirty="0"/>
+              <a:t>Check columns</a:t>
+            </a:r>
+          </a:p>
+          <a:p>
+            <a:pPr lvl="1"/>
+            <a:r>
+              <a:rPr lang="en-US" dirty="0"/>
+              <a:t>Accessing column names using </a:t>
+            </a:r>
+            <a:r>
+              <a:rPr lang="en-US" b="1" dirty="0" err="1"/>
+              <a:t>colnames</a:t>
+            </a:r>
+            <a:r>
+              <a:rPr lang="en-US" b="1" dirty="0"/>
+              <a:t>()</a:t>
+            </a:r>
+          </a:p>
+          <a:p>
+            <a:r>
+              <a:rPr lang="en-US" dirty="0"/>
+              <a:t>Add new columns</a:t>
+            </a:r>
+          </a:p>
+          <a:p>
+            <a:pPr lvl="1"/>
+            <a:r>
+              <a:rPr lang="en-US" dirty="0"/>
+              <a:t>Adding columns based on calculations or conditions</a:t>
+            </a:r>
           </a:p>
         </p:txBody>
       </p:sp>
@@ -6270,7 +6469,7 @@
 </p:sld>
 </file>
 
-<file path=ppt/slides/slide21.xml><?xml version="1.0" encoding="utf-8"?>
+<file path=ppt/slides/slide22.xml><?xml version="1.0" encoding="utf-8"?>
 <p:sld xmlns:a="http://schemas.openxmlformats.org/drawingml/2006/main" xmlns:r="http://schemas.openxmlformats.org/officeDocument/2006/relationships" xmlns:p="http://schemas.openxmlformats.org/presentationml/2006/main">
   <p:cSld>
     <p:spTree>
@@ -6485,7 +6684,7 @@
 </p:sld>
 </file>
 
-<file path=ppt/slides/slide22.xml><?xml version="1.0" encoding="utf-8"?>
+<file path=ppt/slides/slide23.xml><?xml version="1.0" encoding="utf-8"?>
 <p:sld xmlns:a="http://schemas.openxmlformats.org/drawingml/2006/main" xmlns:r="http://schemas.openxmlformats.org/officeDocument/2006/relationships" xmlns:p="http://schemas.openxmlformats.org/presentationml/2006/main">
   <p:cSld>
     <p:spTree>
@@ -6556,16 +6755,24 @@
         <p:spPr>
           <a:xfrm>
             <a:off x="581191" y="1413764"/>
-            <a:ext cx="11029615" cy="618236"/>
-          </a:xfrm>
-        </p:spPr>
-        <p:txBody>
-          <a:bodyPr/>
+            <a:ext cx="11029615" cy="1439164"/>
+          </a:xfrm>
+        </p:spPr>
+        <p:txBody>
+          <a:bodyPr>
+            <a:normAutofit/>
+          </a:bodyPr>
           <a:lstStyle/>
           <a:p>
             <a:r>
               <a:rPr lang="en-US" dirty="0"/>
               <a:t>Explore Tools and Help in RStudio</a:t>
+            </a:r>
+          </a:p>
+          <a:p>
+            <a:r>
+              <a:rPr lang="en-US" dirty="0"/>
+              <a:t>Explore the different tables in RStudio</a:t>
             </a:r>
           </a:p>
         </p:txBody>
@@ -8081,7 +8288,7 @@
         </p:nvSpPr>
         <p:spPr>
           <a:xfrm>
-            <a:off x="1309325" y="2014364"/>
+            <a:off x="1537925" y="1474868"/>
             <a:ext cx="8105775" cy="2416046"/>
           </a:xfrm>
           <a:prstGeom prst="rect">
@@ -8547,10 +8754,9 @@
           </a:lstStyle>
           <a:p>
             <a:r>
-              <a:rPr lang="en-US"/>
+              <a:rPr lang="en-US" dirty="0"/>
               <a:t>Open-source IDE (integrated development environment)</a:t>
             </a:r>
-            <a:endParaRPr lang="en-US" dirty="0"/>
           </a:p>
         </p:txBody>
       </p:sp>
@@ -8675,7 +8881,7 @@
                   <a:srgbClr val="FFFFFF"/>
                 </a:solidFill>
               </a:rPr>
-              <a:t>Lab session</a:t>
+              <a:t>lab session</a:t>
             </a:r>
           </a:p>
         </p:txBody>
@@ -9279,80 +9485,16 @@
         <a:srgbClr val="7F7F7F"/>
       </a:folHlink>
     </a:clrScheme>
-    <a:fontScheme name="Dividend">
+    <a:fontScheme name="Custom 1">
       <a:majorFont>
-        <a:latin typeface="Gill Sans MT" panose="020B0502020104020203"/>
+        <a:latin typeface="Calibri"/>
         <a:ea typeface=""/>
         <a:cs typeface=""/>
-        <a:font script="Grek" typeface="Corbel"/>
-        <a:font script="Cyrl" typeface="Corbel"/>
-        <a:font script="Jpan" typeface="HGｺﾞｼｯｸE"/>
-        <a:font script="Hang" typeface="휴먼매직체"/>
-        <a:font script="Hans" typeface="华文中宋"/>
-        <a:font script="Hant" typeface="微軟正黑體"/>
-        <a:font script="Arab" typeface="Majalla UI"/>
-        <a:font script="Hebr" typeface="Arial"/>
-        <a:font script="Thai" typeface="Cordia New"/>
-        <a:font script="Ethi" typeface="Nyala"/>
-        <a:font script="Beng" typeface="Vrinda"/>
-        <a:font script="Gujr" typeface="Shruti"/>
-        <a:font script="Khmr" typeface="DaunPenh"/>
-        <a:font script="Knda" typeface="Tunga"/>
-        <a:font script="Guru" typeface="Raavi"/>
-        <a:font script="Cans" typeface="Euphemia"/>
-        <a:font script="Cher" typeface="Plantagenet Cherokee"/>
-        <a:font script="Yiii" typeface="Microsoft Yi Baiti"/>
-        <a:font script="Tibt" typeface="Microsoft Himalaya"/>
-        <a:font script="Thaa" typeface="MV Boli"/>
-        <a:font script="Deva" typeface="Mangal"/>
-        <a:font script="Telu" typeface="Gautami"/>
-        <a:font script="Taml" typeface="Latha"/>
-        <a:font script="Syrc" typeface="Estrangelo Edessa"/>
-        <a:font script="Orya" typeface="Kalinga"/>
-        <a:font script="Mlym" typeface="Kartika"/>
-        <a:font script="Laoo" typeface="DokChampa"/>
-        <a:font script="Sinh" typeface="Iskoola Pota"/>
-        <a:font script="Mong" typeface="Mongolian Baiti"/>
-        <a:font script="Viet" typeface="Tahoma"/>
-        <a:font script="Uigh" typeface="Microsoft Uighur"/>
-        <a:font script="Geor" typeface="Sylfaen"/>
       </a:majorFont>
       <a:minorFont>
-        <a:latin typeface="Gill Sans MT" panose="020B0502020104020203"/>
+        <a:latin typeface="Calibri"/>
         <a:ea typeface=""/>
         <a:cs typeface=""/>
-        <a:font script="Grek" typeface="Corbel"/>
-        <a:font script="Cyrl" typeface="Corbel"/>
-        <a:font script="Jpan" typeface="HGｺﾞｼｯｸE"/>
-        <a:font script="Hang" typeface="휴먼매직체"/>
-        <a:font script="Hans" typeface="华文中宋"/>
-        <a:font script="Hant" typeface="微軟正黑體"/>
-        <a:font script="Arab" typeface="Majalla UI"/>
-        <a:font script="Hebr" typeface="Arial"/>
-        <a:font script="Thai" typeface="Cordia New"/>
-        <a:font script="Ethi" typeface="Nyala"/>
-        <a:font script="Beng" typeface="Vrinda"/>
-        <a:font script="Gujr" typeface="Shruti"/>
-        <a:font script="Khmr" typeface="DaunPenh"/>
-        <a:font script="Knda" typeface="Tunga"/>
-        <a:font script="Guru" typeface="Raavi"/>
-        <a:font script="Cans" typeface="Euphemia"/>
-        <a:font script="Cher" typeface="Plantagenet Cherokee"/>
-        <a:font script="Yiii" typeface="Microsoft Yi Baiti"/>
-        <a:font script="Tibt" typeface="Microsoft Himalaya"/>
-        <a:font script="Thaa" typeface="MV Boli"/>
-        <a:font script="Deva" typeface="Mangal"/>
-        <a:font script="Telu" typeface="Gautami"/>
-        <a:font script="Taml" typeface="Latha"/>
-        <a:font script="Syrc" typeface="Estrangelo Edessa"/>
-        <a:font script="Orya" typeface="Kalinga"/>
-        <a:font script="Mlym" typeface="Kartika"/>
-        <a:font script="Laoo" typeface="DokChampa"/>
-        <a:font script="Sinh" typeface="Iskoola Pota"/>
-        <a:font script="Mong" typeface="Mongolian Baiti"/>
-        <a:font script="Viet" typeface="Tahoma"/>
-        <a:font script="Uigh" typeface="Microsoft Uighur"/>
-        <a:font script="Geor" typeface="Sylfaen"/>
       </a:minorFont>
     </a:fontScheme>
     <a:fmtScheme name="Dividend">

</xml_diff>